<commit_message>
updated the pictures in the pdf file
</commit_message>
<xml_diff>
--- a/DesignDocument/Def_sheet_presentation.pptx
+++ b/DesignDocument/Def_sheet_presentation.pptx
@@ -275,35 +275,35 @@
           <a:p>
             <a:pPr lvl="0"/>
             <a:r>
-              <a:rPr lang="de-DE" smtClean="0"/>
+              <a:rPr lang="de-DE"/>
               <a:t>Formatvorlagen des Textmasters bearbeiten</a:t>
             </a:r>
           </a:p>
           <a:p>
             <a:pPr lvl="1"/>
             <a:r>
-              <a:rPr lang="de-DE" smtClean="0"/>
+              <a:rPr lang="de-DE"/>
               <a:t>Zweite Ebene</a:t>
             </a:r>
           </a:p>
           <a:p>
             <a:pPr lvl="2"/>
             <a:r>
-              <a:rPr lang="de-DE" smtClean="0"/>
+              <a:rPr lang="de-DE"/>
               <a:t>Dritte Ebene</a:t>
             </a:r>
           </a:p>
           <a:p>
             <a:pPr lvl="3"/>
             <a:r>
-              <a:rPr lang="de-DE" smtClean="0"/>
+              <a:rPr lang="de-DE"/>
               <a:t>Vierte Ebene</a:t>
             </a:r>
           </a:p>
           <a:p>
             <a:pPr lvl="4"/>
             <a:r>
-              <a:rPr lang="de-DE" smtClean="0"/>
+              <a:rPr lang="de-DE"/>
               <a:t>Fünfte Ebene</a:t>
             </a:r>
             <a:endParaRPr lang="en-US"/>
@@ -1164,7 +1164,7 @@
           </a:lstStyle>
           <a:p>
             <a:r>
-              <a:rPr lang="de-DE" smtClean="0"/>
+              <a:rPr lang="de-DE"/>
               <a:t>Titelmasterformat durch Klicken bearbeiten</a:t>
             </a:r>
             <a:endParaRPr lang="en-US" dirty="0"/>
@@ -1284,7 +1284,7 @@
           </a:lstStyle>
           <a:p>
             <a:r>
-              <a:rPr lang="de-DE" smtClean="0"/>
+              <a:rPr lang="de-DE"/>
               <a:t>Formatvorlage des Untertitelmasters durch Klicken bearbeiten</a:t>
             </a:r>
             <a:endParaRPr lang="en-US" dirty="0"/>
@@ -1413,7 +1413,7 @@
           </a:lstStyle>
           <a:p>
             <a:r>
-              <a:rPr lang="de-DE" smtClean="0"/>
+              <a:rPr lang="de-DE"/>
               <a:t>Titelmasterformat durch Klicken bearbeiten</a:t>
             </a:r>
             <a:endParaRPr lang="en-US" dirty="0"/>
@@ -1536,7 +1536,7 @@
           <a:p>
             <a:pPr lvl="0"/>
             <a:r>
-              <a:rPr lang="de-DE" smtClean="0"/>
+              <a:rPr lang="de-DE"/>
               <a:t>Formatvorlagen des Textmasters bearbeiten</a:t>
             </a:r>
           </a:p>
@@ -1664,7 +1664,7 @@
           </a:lstStyle>
           <a:p>
             <a:r>
-              <a:rPr lang="de-DE" smtClean="0"/>
+              <a:rPr lang="de-DE"/>
               <a:t>Titelmasterformat durch Klicken bearbeiten</a:t>
             </a:r>
             <a:endParaRPr lang="en-US" dirty="0"/>
@@ -1728,7 +1728,7 @@
           <a:p>
             <a:pPr lvl="0"/>
             <a:r>
-              <a:rPr lang="de-DE" smtClean="0"/>
+              <a:rPr lang="de-DE"/>
               <a:t>Formatvorlagen des Textmasters bearbeiten</a:t>
             </a:r>
           </a:p>
@@ -1850,7 +1850,7 @@
           <a:p>
             <a:pPr lvl="0"/>
             <a:r>
-              <a:rPr lang="de-DE" smtClean="0"/>
+              <a:rPr lang="de-DE"/>
               <a:t>Formatvorlagen des Textmasters bearbeiten</a:t>
             </a:r>
           </a:p>
@@ -2060,7 +2060,7 @@
           </a:lstStyle>
           <a:p>
             <a:r>
-              <a:rPr lang="de-DE" smtClean="0"/>
+              <a:rPr lang="de-DE"/>
               <a:t>Titelmasterformat durch Klicken bearbeiten</a:t>
             </a:r>
             <a:endParaRPr lang="en-US" dirty="0"/>
@@ -2183,7 +2183,7 @@
           <a:p>
             <a:pPr lvl="0"/>
             <a:r>
-              <a:rPr lang="de-DE" smtClean="0"/>
+              <a:rPr lang="de-DE"/>
               <a:t>Formatvorlagen des Textmasters bearbeiten</a:t>
             </a:r>
           </a:p>
@@ -2311,7 +2311,7 @@
           </a:lstStyle>
           <a:p>
             <a:r>
-              <a:rPr lang="de-DE" smtClean="0"/>
+              <a:rPr lang="de-DE"/>
               <a:t>Titelmasterformat durch Klicken bearbeiten</a:t>
             </a:r>
             <a:endParaRPr lang="en-US" dirty="0"/>
@@ -2375,7 +2375,7 @@
           <a:p>
             <a:pPr lvl="0"/>
             <a:r>
-              <a:rPr lang="de-DE" smtClean="0"/>
+              <a:rPr lang="de-DE"/>
               <a:t>Formatvorlagen des Textmasters bearbeiten</a:t>
             </a:r>
           </a:p>
@@ -2497,7 +2497,7 @@
           <a:p>
             <a:pPr lvl="0"/>
             <a:r>
-              <a:rPr lang="de-DE" smtClean="0"/>
+              <a:rPr lang="de-DE"/>
               <a:t>Formatvorlagen des Textmasters bearbeiten</a:t>
             </a:r>
           </a:p>
@@ -2707,7 +2707,7 @@
           </a:lstStyle>
           <a:p>
             <a:r>
-              <a:rPr lang="de-DE" smtClean="0"/>
+              <a:rPr lang="de-DE"/>
               <a:t>Titelmasterformat durch Klicken bearbeiten</a:t>
             </a:r>
             <a:endParaRPr lang="en-US" dirty="0"/>
@@ -2768,7 +2768,7 @@
           <a:p>
             <a:pPr lvl="0"/>
             <a:r>
-              <a:rPr lang="de-DE" smtClean="0"/>
+              <a:rPr lang="de-DE"/>
               <a:t>Formatvorlagen des Textmasters bearbeiten</a:t>
             </a:r>
           </a:p>
@@ -2890,7 +2890,7 @@
           <a:p>
             <a:pPr lvl="0"/>
             <a:r>
-              <a:rPr lang="de-DE" smtClean="0"/>
+              <a:rPr lang="de-DE"/>
               <a:t>Formatvorlagen des Textmasters bearbeiten</a:t>
             </a:r>
           </a:p>
@@ -3007,7 +3007,7 @@
           <a:lstStyle/>
           <a:p>
             <a:r>
-              <a:rPr lang="de-DE" smtClean="0"/>
+              <a:rPr lang="de-DE"/>
               <a:t>Titelmasterformat durch Klicken bearbeiten</a:t>
             </a:r>
             <a:endParaRPr lang="en-US" dirty="0"/>
@@ -3031,35 +3031,35 @@
           <a:p>
             <a:pPr lvl="0"/>
             <a:r>
-              <a:rPr lang="de-DE" smtClean="0"/>
+              <a:rPr lang="de-DE"/>
               <a:t>Formatvorlagen des Textmasters bearbeiten</a:t>
             </a:r>
           </a:p>
           <a:p>
             <a:pPr lvl="1"/>
             <a:r>
-              <a:rPr lang="de-DE" smtClean="0"/>
+              <a:rPr lang="de-DE"/>
               <a:t>Zweite Ebene</a:t>
             </a:r>
           </a:p>
           <a:p>
             <a:pPr lvl="2"/>
             <a:r>
-              <a:rPr lang="de-DE" smtClean="0"/>
+              <a:rPr lang="de-DE"/>
               <a:t>Dritte Ebene</a:t>
             </a:r>
           </a:p>
           <a:p>
             <a:pPr lvl="3"/>
             <a:r>
-              <a:rPr lang="de-DE" smtClean="0"/>
+              <a:rPr lang="de-DE"/>
               <a:t>Vierte Ebene</a:t>
             </a:r>
           </a:p>
           <a:p>
             <a:pPr lvl="4"/>
             <a:r>
-              <a:rPr lang="de-DE" smtClean="0"/>
+              <a:rPr lang="de-DE"/>
               <a:t>Fünfte Ebene</a:t>
             </a:r>
             <a:endParaRPr lang="en-US" dirty="0"/>
@@ -3182,7 +3182,7 @@
           <a:lstStyle/>
           <a:p>
             <a:r>
-              <a:rPr lang="de-DE" smtClean="0"/>
+              <a:rPr lang="de-DE"/>
               <a:t>Titelmasterformat durch Klicken bearbeiten</a:t>
             </a:r>
             <a:endParaRPr lang="en-US" dirty="0"/>
@@ -3211,35 +3211,35 @@
           <a:p>
             <a:pPr lvl="0"/>
             <a:r>
-              <a:rPr lang="de-DE" smtClean="0"/>
+              <a:rPr lang="de-DE"/>
               <a:t>Formatvorlagen des Textmasters bearbeiten</a:t>
             </a:r>
           </a:p>
           <a:p>
             <a:pPr lvl="1"/>
             <a:r>
-              <a:rPr lang="de-DE" smtClean="0"/>
+              <a:rPr lang="de-DE"/>
               <a:t>Zweite Ebene</a:t>
             </a:r>
           </a:p>
           <a:p>
             <a:pPr lvl="2"/>
             <a:r>
-              <a:rPr lang="de-DE" smtClean="0"/>
+              <a:rPr lang="de-DE"/>
               <a:t>Dritte Ebene</a:t>
             </a:r>
           </a:p>
           <a:p>
             <a:pPr lvl="3"/>
             <a:r>
-              <a:rPr lang="de-DE" smtClean="0"/>
+              <a:rPr lang="de-DE"/>
               <a:t>Vierte Ebene</a:t>
             </a:r>
           </a:p>
           <a:p>
             <a:pPr lvl="4"/>
             <a:r>
-              <a:rPr lang="de-DE" smtClean="0"/>
+              <a:rPr lang="de-DE"/>
               <a:t>Fünfte Ebene</a:t>
             </a:r>
             <a:endParaRPr lang="en-US" dirty="0"/>
@@ -3357,7 +3357,7 @@
           <a:lstStyle/>
           <a:p>
             <a:r>
-              <a:rPr lang="de-DE" smtClean="0"/>
+              <a:rPr lang="de-DE"/>
               <a:t>Titelmasterformat durch Klicken bearbeiten</a:t>
             </a:r>
             <a:endParaRPr lang="en-US" dirty="0"/>
@@ -3381,35 +3381,35 @@
           <a:p>
             <a:pPr lvl="0"/>
             <a:r>
-              <a:rPr lang="de-DE" smtClean="0"/>
+              <a:rPr lang="de-DE"/>
               <a:t>Formatvorlagen des Textmasters bearbeiten</a:t>
             </a:r>
           </a:p>
           <a:p>
             <a:pPr lvl="1"/>
             <a:r>
-              <a:rPr lang="de-DE" smtClean="0"/>
+              <a:rPr lang="de-DE"/>
               <a:t>Zweite Ebene</a:t>
             </a:r>
           </a:p>
           <a:p>
             <a:pPr lvl="2"/>
             <a:r>
-              <a:rPr lang="de-DE" smtClean="0"/>
+              <a:rPr lang="de-DE"/>
               <a:t>Dritte Ebene</a:t>
             </a:r>
           </a:p>
           <a:p>
             <a:pPr lvl="3"/>
             <a:r>
-              <a:rPr lang="de-DE" smtClean="0"/>
+              <a:rPr lang="de-DE"/>
               <a:t>Vierte Ebene</a:t>
             </a:r>
           </a:p>
           <a:p>
             <a:pPr lvl="4"/>
             <a:r>
-              <a:rPr lang="de-DE" smtClean="0"/>
+              <a:rPr lang="de-DE"/>
               <a:t>Fünfte Ebene</a:t>
             </a:r>
             <a:endParaRPr lang="en-US" dirty="0"/>
@@ -3536,7 +3536,7 @@
           </a:lstStyle>
           <a:p>
             <a:r>
-              <a:rPr lang="de-DE" smtClean="0"/>
+              <a:rPr lang="de-DE"/>
               <a:t>Titelmasterformat durch Klicken bearbeiten</a:t>
             </a:r>
             <a:endParaRPr lang="en-US" dirty="0"/>
@@ -3657,7 +3657,7 @@
           <a:p>
             <a:pPr lvl="0"/>
             <a:r>
-              <a:rPr lang="de-DE" smtClean="0"/>
+              <a:rPr lang="de-DE"/>
               <a:t>Formatvorlagen des Textmasters bearbeiten</a:t>
             </a:r>
           </a:p>
@@ -3774,7 +3774,7 @@
           <a:lstStyle/>
           <a:p>
             <a:r>
-              <a:rPr lang="de-DE" smtClean="0"/>
+              <a:rPr lang="de-DE"/>
               <a:t>Titelmasterformat durch Klicken bearbeiten</a:t>
             </a:r>
             <a:endParaRPr lang="en-US" dirty="0"/>
@@ -3803,35 +3803,35 @@
           <a:p>
             <a:pPr lvl="0"/>
             <a:r>
-              <a:rPr lang="de-DE" smtClean="0"/>
+              <a:rPr lang="de-DE"/>
               <a:t>Formatvorlagen des Textmasters bearbeiten</a:t>
             </a:r>
           </a:p>
           <a:p>
             <a:pPr lvl="1"/>
             <a:r>
-              <a:rPr lang="de-DE" smtClean="0"/>
+              <a:rPr lang="de-DE"/>
               <a:t>Zweite Ebene</a:t>
             </a:r>
           </a:p>
           <a:p>
             <a:pPr lvl="2"/>
             <a:r>
-              <a:rPr lang="de-DE" smtClean="0"/>
+              <a:rPr lang="de-DE"/>
               <a:t>Dritte Ebene</a:t>
             </a:r>
           </a:p>
           <a:p>
             <a:pPr lvl="3"/>
             <a:r>
-              <a:rPr lang="de-DE" smtClean="0"/>
+              <a:rPr lang="de-DE"/>
               <a:t>Vierte Ebene</a:t>
             </a:r>
           </a:p>
           <a:p>
             <a:pPr lvl="4"/>
             <a:r>
-              <a:rPr lang="de-DE" smtClean="0"/>
+              <a:rPr lang="de-DE"/>
               <a:t>Fünfte Ebene</a:t>
             </a:r>
             <a:endParaRPr lang="en-US" dirty="0"/>
@@ -3860,35 +3860,35 @@
           <a:p>
             <a:pPr lvl="0"/>
             <a:r>
-              <a:rPr lang="de-DE" smtClean="0"/>
+              <a:rPr lang="de-DE"/>
               <a:t>Formatvorlagen des Textmasters bearbeiten</a:t>
             </a:r>
           </a:p>
           <a:p>
             <a:pPr lvl="1"/>
             <a:r>
-              <a:rPr lang="de-DE" smtClean="0"/>
+              <a:rPr lang="de-DE"/>
               <a:t>Zweite Ebene</a:t>
             </a:r>
           </a:p>
           <a:p>
             <a:pPr lvl="2"/>
             <a:r>
-              <a:rPr lang="de-DE" smtClean="0"/>
+              <a:rPr lang="de-DE"/>
               <a:t>Dritte Ebene</a:t>
             </a:r>
           </a:p>
           <a:p>
             <a:pPr lvl="3"/>
             <a:r>
-              <a:rPr lang="de-DE" smtClean="0"/>
+              <a:rPr lang="de-DE"/>
               <a:t>Vierte Ebene</a:t>
             </a:r>
           </a:p>
           <a:p>
             <a:pPr lvl="4"/>
             <a:r>
-              <a:rPr lang="de-DE" smtClean="0"/>
+              <a:rPr lang="de-DE"/>
               <a:t>Fünfte Ebene</a:t>
             </a:r>
             <a:endParaRPr lang="en-US" dirty="0"/>
@@ -4010,7 +4010,7 @@
           </a:lstStyle>
           <a:p>
             <a:r>
-              <a:rPr lang="de-DE" smtClean="0"/>
+              <a:rPr lang="de-DE"/>
               <a:t>Titelmasterformat durch Klicken bearbeiten</a:t>
             </a:r>
             <a:endParaRPr lang="en-US" dirty="0"/>
@@ -4078,7 +4078,7 @@
           <a:p>
             <a:pPr lvl="0"/>
             <a:r>
-              <a:rPr lang="de-DE" smtClean="0"/>
+              <a:rPr lang="de-DE"/>
               <a:t>Formatvorlagen des Textmasters bearbeiten</a:t>
             </a:r>
           </a:p>
@@ -4108,35 +4108,35 @@
           <a:p>
             <a:pPr lvl="0"/>
             <a:r>
-              <a:rPr lang="de-DE" smtClean="0"/>
+              <a:rPr lang="de-DE"/>
               <a:t>Formatvorlagen des Textmasters bearbeiten</a:t>
             </a:r>
           </a:p>
           <a:p>
             <a:pPr lvl="1"/>
             <a:r>
-              <a:rPr lang="de-DE" smtClean="0"/>
+              <a:rPr lang="de-DE"/>
               <a:t>Zweite Ebene</a:t>
             </a:r>
           </a:p>
           <a:p>
             <a:pPr lvl="2"/>
             <a:r>
-              <a:rPr lang="de-DE" smtClean="0"/>
+              <a:rPr lang="de-DE"/>
               <a:t>Dritte Ebene</a:t>
             </a:r>
           </a:p>
           <a:p>
             <a:pPr lvl="3"/>
             <a:r>
-              <a:rPr lang="de-DE" smtClean="0"/>
+              <a:rPr lang="de-DE"/>
               <a:t>Vierte Ebene</a:t>
             </a:r>
           </a:p>
           <a:p>
             <a:pPr lvl="4"/>
             <a:r>
-              <a:rPr lang="de-DE" smtClean="0"/>
+              <a:rPr lang="de-DE"/>
               <a:t>Fünfte Ebene</a:t>
             </a:r>
             <a:endParaRPr lang="en-US" dirty="0"/>
@@ -4204,7 +4204,7 @@
           <a:p>
             <a:pPr lvl="0"/>
             <a:r>
-              <a:rPr lang="de-DE" smtClean="0"/>
+              <a:rPr lang="de-DE"/>
               <a:t>Formatvorlagen des Textmasters bearbeiten</a:t>
             </a:r>
           </a:p>
@@ -4234,35 +4234,35 @@
           <a:p>
             <a:pPr lvl="0"/>
             <a:r>
-              <a:rPr lang="de-DE" smtClean="0"/>
+              <a:rPr lang="de-DE"/>
               <a:t>Formatvorlagen des Textmasters bearbeiten</a:t>
             </a:r>
           </a:p>
           <a:p>
             <a:pPr lvl="1"/>
             <a:r>
-              <a:rPr lang="de-DE" smtClean="0"/>
+              <a:rPr lang="de-DE"/>
               <a:t>Zweite Ebene</a:t>
             </a:r>
           </a:p>
           <a:p>
             <a:pPr lvl="2"/>
             <a:r>
-              <a:rPr lang="de-DE" smtClean="0"/>
+              <a:rPr lang="de-DE"/>
               <a:t>Dritte Ebene</a:t>
             </a:r>
           </a:p>
           <a:p>
             <a:pPr lvl="3"/>
             <a:r>
-              <a:rPr lang="de-DE" smtClean="0"/>
+              <a:rPr lang="de-DE"/>
               <a:t>Vierte Ebene</a:t>
             </a:r>
           </a:p>
           <a:p>
             <a:pPr lvl="4"/>
             <a:r>
-              <a:rPr lang="de-DE" smtClean="0"/>
+              <a:rPr lang="de-DE"/>
               <a:t>Fünfte Ebene</a:t>
             </a:r>
             <a:endParaRPr lang="en-US" dirty="0"/>
@@ -4385,7 +4385,7 @@
           <a:lstStyle/>
           <a:p>
             <a:r>
-              <a:rPr lang="de-DE" smtClean="0"/>
+              <a:rPr lang="de-DE"/>
               <a:t>Titelmasterformat durch Klicken bearbeiten</a:t>
             </a:r>
             <a:endParaRPr lang="en-US" dirty="0"/>
@@ -4609,7 +4609,7 @@
           </a:lstStyle>
           <a:p>
             <a:r>
-              <a:rPr lang="de-DE" smtClean="0"/>
+              <a:rPr lang="de-DE"/>
               <a:t>Titelmasterformat durch Klicken bearbeiten</a:t>
             </a:r>
             <a:endParaRPr lang="en-US" dirty="0"/>
@@ -4640,35 +4640,35 @@
           <a:p>
             <a:pPr lvl="0"/>
             <a:r>
-              <a:rPr lang="de-DE" smtClean="0"/>
+              <a:rPr lang="de-DE"/>
               <a:t>Formatvorlagen des Textmasters bearbeiten</a:t>
             </a:r>
           </a:p>
           <a:p>
             <a:pPr lvl="1"/>
             <a:r>
-              <a:rPr lang="de-DE" smtClean="0"/>
+              <a:rPr lang="de-DE"/>
               <a:t>Zweite Ebene</a:t>
             </a:r>
           </a:p>
           <a:p>
             <a:pPr lvl="2"/>
             <a:r>
-              <a:rPr lang="de-DE" smtClean="0"/>
+              <a:rPr lang="de-DE"/>
               <a:t>Dritte Ebene</a:t>
             </a:r>
           </a:p>
           <a:p>
             <a:pPr lvl="3"/>
             <a:r>
-              <a:rPr lang="de-DE" smtClean="0"/>
+              <a:rPr lang="de-DE"/>
               <a:t>Vierte Ebene</a:t>
             </a:r>
           </a:p>
           <a:p>
             <a:pPr lvl="4"/>
             <a:r>
-              <a:rPr lang="de-DE" smtClean="0"/>
+              <a:rPr lang="de-DE"/>
               <a:t>Fünfte Ebene</a:t>
             </a:r>
             <a:endParaRPr lang="en-US" dirty="0"/>
@@ -4736,7 +4736,7 @@
           <a:p>
             <a:pPr lvl="0"/>
             <a:r>
-              <a:rPr lang="de-DE" smtClean="0"/>
+              <a:rPr lang="de-DE"/>
               <a:t>Formatvorlagen des Textmasters bearbeiten</a:t>
             </a:r>
           </a:p>
@@ -4864,7 +4864,7 @@
           </a:lstStyle>
           <a:p>
             <a:r>
-              <a:rPr lang="de-DE" smtClean="0"/>
+              <a:rPr lang="de-DE"/>
               <a:t>Titelmasterformat durch Klicken bearbeiten</a:t>
             </a:r>
             <a:endParaRPr lang="en-US" dirty="0"/>
@@ -4931,7 +4931,7 @@
           </a:lstStyle>
           <a:p>
             <a:r>
-              <a:rPr lang="de-DE" smtClean="0"/>
+              <a:rPr lang="de-DE"/>
               <a:t>Bild durch Klicken auf Symbol hinzufügen</a:t>
             </a:r>
             <a:endParaRPr lang="en-US" dirty="0"/>
@@ -4999,7 +4999,7 @@
           <a:p>
             <a:pPr lvl="0"/>
             <a:r>
-              <a:rPr lang="de-DE" smtClean="0"/>
+              <a:rPr lang="de-DE"/>
               <a:t>Formatvorlagen des Textmasters bearbeiten</a:t>
             </a:r>
           </a:p>
@@ -5662,7 +5662,7 @@
           <a:lstStyle/>
           <a:p>
             <a:r>
-              <a:rPr lang="de-DE" smtClean="0"/>
+              <a:rPr lang="de-DE"/>
               <a:t>Titelmasterformat durch Klicken bearbeiten</a:t>
             </a:r>
             <a:endParaRPr lang="en-US" dirty="0"/>
@@ -5696,35 +5696,35 @@
           <a:p>
             <a:pPr lvl="0"/>
             <a:r>
-              <a:rPr lang="de-DE" smtClean="0"/>
+              <a:rPr lang="de-DE"/>
               <a:t>Formatvorlagen des Textmasters bearbeiten</a:t>
             </a:r>
           </a:p>
           <a:p>
             <a:pPr lvl="1"/>
             <a:r>
-              <a:rPr lang="de-DE" smtClean="0"/>
+              <a:rPr lang="de-DE"/>
               <a:t>Zweite Ebene</a:t>
             </a:r>
           </a:p>
           <a:p>
             <a:pPr lvl="2"/>
             <a:r>
-              <a:rPr lang="de-DE" smtClean="0"/>
+              <a:rPr lang="de-DE"/>
               <a:t>Dritte Ebene</a:t>
             </a:r>
           </a:p>
           <a:p>
             <a:pPr lvl="3"/>
             <a:r>
-              <a:rPr lang="de-DE" smtClean="0"/>
+              <a:rPr lang="de-DE"/>
               <a:t>Vierte Ebene</a:t>
             </a:r>
           </a:p>
           <a:p>
             <a:pPr lvl="4"/>
             <a:r>
-              <a:rPr lang="de-DE" smtClean="0"/>
+              <a:rPr lang="de-DE"/>
               <a:t>Fünfte Ebene</a:t>
             </a:r>
             <a:endParaRPr lang="en-US" dirty="0"/>
@@ -6306,7 +6306,7 @@
           <a:lstStyle/>
           <a:p>
             <a:r>
-              <a:rPr lang="en-US" b="1" dirty="0" smtClean="0"/>
+              <a:rPr lang="en-US" b="1" dirty="0"/>
               <a:t>Numerical Linear Algebra meets Machine Learning</a:t>
             </a:r>
             <a:endParaRPr lang="en-US" dirty="0"/>
@@ -6335,48 +6335,43 @@
               <a:t>Fabian </a:t>
             </a:r>
             <a:r>
-              <a:rPr lang="en-US" dirty="0" err="1" smtClean="0"/>
+              <a:rPr lang="en-US" dirty="0" err="1"/>
               <a:t>Koffer</a:t>
             </a:r>
             <a:r>
-              <a:rPr lang="en-US" dirty="0" smtClean="0"/>
+              <a:rPr lang="en-US" dirty="0"/>
               <a:t>, Simon </a:t>
             </a:r>
             <a:r>
-              <a:rPr lang="en-US" dirty="0" err="1" smtClean="0"/>
+              <a:rPr lang="en-US" dirty="0" err="1"/>
               <a:t>Hanselmann</a:t>
             </a:r>
             <a:r>
-              <a:rPr lang="en-US" dirty="0" smtClean="0"/>
+              <a:rPr lang="en-US" dirty="0"/>
               <a:t>, </a:t>
             </a:r>
             <a:r>
-              <a:rPr lang="en-US" dirty="0" err="1" smtClean="0"/>
+              <a:rPr lang="en-US" dirty="0" err="1"/>
               <a:t>Yannick</a:t>
             </a:r>
             <a:r>
-              <a:rPr lang="en-US" dirty="0" smtClean="0"/>
+              <a:rPr lang="en-US" dirty="0"/>
               <a:t> Funk, </a:t>
             </a:r>
           </a:p>
           <a:p>
             <a:r>
-              <a:rPr lang="en-US" dirty="0" smtClean="0"/>
-              <a:t>Dennis </a:t>
-            </a:r>
-            <a:r>
               <a:rPr lang="en-US" dirty="0"/>
-              <a:t>Leon </a:t>
-            </a:r>
-            <a:r>
-              <a:rPr lang="en-US" dirty="0" err="1" smtClean="0"/>
+              <a:t>Dennis Leon </a:t>
+            </a:r>
+            <a:r>
+              <a:rPr lang="en-US" dirty="0" err="1"/>
               <a:t>Grötzinger</a:t>
             </a:r>
             <a:r>
-              <a:rPr lang="en-US" dirty="0" smtClean="0"/>
+              <a:rPr lang="en-US" dirty="0"/>
               <a:t>, Anna Ricker</a:t>
             </a:r>
-            <a:endParaRPr lang="en-US" dirty="0"/>
           </a:p>
           <a:p>
             <a:endParaRPr lang="en-US" dirty="0"/>
@@ -6393,13 +6388,6 @@
   <p:clrMapOvr>
     <a:masterClrMapping/>
   </p:clrMapOvr>
-  <p:timing>
-    <p:tnLst>
-      <p:par>
-        <p:cTn id="1" dur="indefinite" restart="never" nodeType="tmRoot"/>
-      </p:par>
-    </p:tnLst>
-  </p:timing>
 </p:sld>
 </file>
 
@@ -6442,11 +6430,11 @@
           <a:p>
             <a:pPr algn="ctr"/>
             <a:r>
-              <a:rPr lang="de-DE" dirty="0" err="1" smtClean="0"/>
+              <a:rPr lang="de-DE" dirty="0" err="1"/>
               <a:t>Labeling</a:t>
             </a:r>
             <a:r>
-              <a:rPr lang="de-DE" dirty="0" smtClean="0"/>
+              <a:rPr lang="de-DE" dirty="0"/>
               <a:t> Module</a:t>
             </a:r>
             <a:endParaRPr lang="en-US" dirty="0"/>
@@ -6595,7 +6583,7 @@
           <a:p>
             <a:pPr algn="ctr"/>
             <a:r>
-              <a:rPr lang="de-DE" dirty="0" smtClean="0"/>
+              <a:rPr lang="de-DE" dirty="0"/>
               <a:t>Training Module</a:t>
             </a:r>
             <a:endParaRPr lang="en-US" dirty="0"/>
@@ -6677,11 +6665,11 @@
           <a:lstStyle/>
           <a:p>
             <a:r>
-              <a:rPr lang="de-DE" dirty="0" err="1" smtClean="0"/>
+              <a:rPr lang="de-DE" dirty="0" err="1"/>
               <a:t>Classify</a:t>
             </a:r>
             <a:r>
-              <a:rPr lang="de-DE" dirty="0" smtClean="0"/>
+              <a:rPr lang="de-DE" dirty="0"/>
               <a:t> Module</a:t>
             </a:r>
             <a:endParaRPr lang="en-US" dirty="0"/>
@@ -6891,15 +6879,15 @@
           <a:lstStyle/>
           <a:p>
             <a:r>
-              <a:rPr lang="de-DE" dirty="0" err="1" smtClean="0"/>
+              <a:rPr lang="de-DE" dirty="0" err="1"/>
               <a:t>Component</a:t>
             </a:r>
             <a:r>
-              <a:rPr lang="de-DE" dirty="0" smtClean="0"/>
+              <a:rPr lang="de-DE" dirty="0"/>
               <a:t> </a:t>
             </a:r>
             <a:r>
-              <a:rPr lang="de-DE" dirty="0" err="1" smtClean="0"/>
+              <a:rPr lang="de-DE" dirty="0" err="1"/>
               <a:t>Diagram</a:t>
             </a:r>
             <a:endParaRPr lang="en-US" dirty="0"/>
@@ -6988,7 +6976,7 @@
           <a:p>
             <a:pPr algn="ctr"/>
             <a:r>
-              <a:rPr lang="de-DE" dirty="0" smtClean="0"/>
+              <a:rPr lang="de-DE" dirty="0"/>
               <a:t>View Module</a:t>
             </a:r>
             <a:endParaRPr lang="en-US" dirty="0"/>
@@ -6997,7 +6985,13 @@
       </p:sp>
       <p:pic>
         <p:nvPicPr>
-          <p:cNvPr id="4" name="Grafik 3"/>
+          <p:cNvPr id="6" name="Grafik 5">
+            <a:extLst>
+              <a:ext uri="{FF2B5EF4-FFF2-40B4-BE49-F238E27FC236}">
+                <a16:creationId xmlns:a16="http://schemas.microsoft.com/office/drawing/2014/main" id="{B0C17CED-B2F8-4544-BC34-F8220E3502AA}"/>
+              </a:ext>
+            </a:extLst>
+          </p:cNvPr>
           <p:cNvPicPr>
             <a:picLocks noChangeAspect="1"/>
           </p:cNvPicPr>
@@ -7017,8 +7011,8 @@
         </p:blipFill>
         <p:spPr>
           <a:xfrm>
-            <a:off x="473449" y="1392574"/>
-            <a:ext cx="8367361" cy="5173870"/>
+            <a:off x="1170913" y="1514475"/>
+            <a:ext cx="7686675" cy="4743450"/>
           </a:xfrm>
           <a:prstGeom prst="rect">
             <a:avLst/>
@@ -7057,7 +7051,13 @@
       </p:grpSpPr>
       <p:pic>
         <p:nvPicPr>
-          <p:cNvPr id="2" name="Grafik 1"/>
+          <p:cNvPr id="4" name="Grafik 3">
+            <a:extLst>
+              <a:ext uri="{FF2B5EF4-FFF2-40B4-BE49-F238E27FC236}">
+                <a16:creationId xmlns:a16="http://schemas.microsoft.com/office/drawing/2014/main" id="{DCEBB940-3826-4FD6-89F4-434F64B5B047}"/>
+              </a:ext>
+            </a:extLst>
+          </p:cNvPr>
           <p:cNvPicPr>
             <a:picLocks noChangeAspect="1"/>
           </p:cNvPicPr>
@@ -7077,8 +7077,8 @@
         </p:blipFill>
         <p:spPr>
           <a:xfrm>
-            <a:off x="720436" y="530991"/>
-            <a:ext cx="8388147" cy="5281857"/>
+            <a:off x="1472066" y="1426482"/>
+            <a:ext cx="6867525" cy="4324350"/>
           </a:xfrm>
           <a:prstGeom prst="rect">
             <a:avLst/>
@@ -7137,7 +7137,7 @@
           <a:p>
             <a:pPr algn="ctr"/>
             <a:r>
-              <a:rPr lang="de-DE" dirty="0" smtClean="0"/>
+              <a:rPr lang="de-DE" dirty="0"/>
               <a:t>Controller Module</a:t>
             </a:r>
             <a:endParaRPr lang="en-US" dirty="0"/>
@@ -7146,7 +7146,13 @@
       </p:sp>
       <p:pic>
         <p:nvPicPr>
-          <p:cNvPr id="4" name="Grafik 3"/>
+          <p:cNvPr id="5" name="Grafik 4">
+            <a:extLst>
+              <a:ext uri="{FF2B5EF4-FFF2-40B4-BE49-F238E27FC236}">
+                <a16:creationId xmlns:a16="http://schemas.microsoft.com/office/drawing/2014/main" id="{579E7B1B-9464-477C-8BE1-D861DFB29DCA}"/>
+              </a:ext>
+            </a:extLst>
+          </p:cNvPr>
           <p:cNvPicPr>
             <a:picLocks noChangeAspect="1"/>
           </p:cNvPicPr>
@@ -7166,8 +7172,8 @@
         </p:blipFill>
         <p:spPr>
           <a:xfrm>
-            <a:off x="333062" y="1283517"/>
-            <a:ext cx="8864845" cy="4521666"/>
+            <a:off x="328669" y="1122759"/>
+            <a:ext cx="9042891" cy="4612481"/>
           </a:xfrm>
           <a:prstGeom prst="rect">
             <a:avLst/>
@@ -7206,7 +7212,13 @@
       </p:grpSpPr>
       <p:pic>
         <p:nvPicPr>
-          <p:cNvPr id="2" name="Grafik 1"/>
+          <p:cNvPr id="4" name="Grafik 3">
+            <a:extLst>
+              <a:ext uri="{FF2B5EF4-FFF2-40B4-BE49-F238E27FC236}">
+                <a16:creationId xmlns:a16="http://schemas.microsoft.com/office/drawing/2014/main" id="{C7B59DA5-BC0A-4F06-BD6D-A8DEE3878760}"/>
+              </a:ext>
+            </a:extLst>
+          </p:cNvPr>
           <p:cNvPicPr>
             <a:picLocks noChangeAspect="1"/>
           </p:cNvPicPr>
@@ -7226,8 +7238,8 @@
         </p:blipFill>
         <p:spPr>
           <a:xfrm>
-            <a:off x="605300" y="394281"/>
-            <a:ext cx="9095570" cy="6371439"/>
+            <a:off x="344576" y="159656"/>
+            <a:ext cx="8971727" cy="6284687"/>
           </a:xfrm>
           <a:prstGeom prst="rect">
             <a:avLst/>
@@ -7285,11 +7297,11 @@
           <a:lstStyle/>
           <a:p>
             <a:r>
-              <a:rPr lang="de-DE" dirty="0" smtClean="0"/>
+              <a:rPr lang="de-DE" dirty="0"/>
               <a:t>Help </a:t>
             </a:r>
             <a:r>
-              <a:rPr lang="de-DE" dirty="0" err="1" smtClean="0"/>
+              <a:rPr lang="de-DE" dirty="0" err="1"/>
               <a:t>classes</a:t>
             </a:r>
             <a:endParaRPr lang="en-US" dirty="0"/>
@@ -7372,11 +7384,11 @@
           <a:p>
             <a:pPr algn="ctr"/>
             <a:r>
-              <a:rPr lang="de-DE" dirty="0" err="1" smtClean="0"/>
+              <a:rPr lang="de-DE" dirty="0" err="1"/>
               <a:t>Collector</a:t>
             </a:r>
             <a:r>
-              <a:rPr lang="de-DE" dirty="0" smtClean="0"/>
+              <a:rPr lang="de-DE" dirty="0"/>
               <a:t> Module</a:t>
             </a:r>
             <a:endParaRPr lang="en-US" dirty="0"/>

</xml_diff>

<commit_message>
edited Big classdiagram and presentation
</commit_message>
<xml_diff>
--- a/DesignDocument/Def_sheet_presentation.pptx
+++ b/DesignDocument/Def_sheet_presentation.pptx
@@ -10,10 +10,10 @@
   <p:sldIdLst>
     <p:sldId id="276" r:id="rId2"/>
     <p:sldId id="283" r:id="rId3"/>
-    <p:sldId id="285" r:id="rId4"/>
-    <p:sldId id="293" r:id="rId5"/>
-    <p:sldId id="284" r:id="rId6"/>
-    <p:sldId id="291" r:id="rId7"/>
+    <p:sldId id="284" r:id="rId4"/>
+    <p:sldId id="291" r:id="rId5"/>
+    <p:sldId id="285" r:id="rId6"/>
+    <p:sldId id="293" r:id="rId7"/>
     <p:sldId id="289" r:id="rId8"/>
     <p:sldId id="286" r:id="rId9"/>
     <p:sldId id="295" r:id="rId10"/>
@@ -127,6 +127,32 @@
     </p:ext>
   </p:extLst>
 </p:presentation>
+</file>
+
+<file path=ppt/commentAuthors.xml><?xml version="1.0" encoding="utf-8"?>
+<p:cmAuthorLst xmlns:a="http://schemas.openxmlformats.org/drawingml/2006/main" xmlns:r="http://schemas.openxmlformats.org/officeDocument/2006/relationships" xmlns:p="http://schemas.openxmlformats.org/presentationml/2006/main">
+  <p:cmAuthor id="1" name="Anna Ricker" initials="AR" lastIdx="1" clrIdx="0">
+    <p:extLst>
+      <p:ext uri="{19B8F6BF-5375-455C-9EA6-DF929625EA0E}">
+        <p15:presenceInfo xmlns:p15="http://schemas.microsoft.com/office/powerpoint/2012/main" userId="040ce179a8609663" providerId="Windows Live"/>
+      </p:ext>
+    </p:extLst>
+  </p:cmAuthor>
+</p:cmAuthorLst>
+</file>
+
+<file path=ppt/comments/comment1.xml><?xml version="1.0" encoding="utf-8"?>
+<p:cmLst xmlns:a="http://schemas.openxmlformats.org/drawingml/2006/main" xmlns:r="http://schemas.openxmlformats.org/officeDocument/2006/relationships" xmlns:p="http://schemas.openxmlformats.org/presentationml/2006/main">
+  <p:cm authorId="1" dt="2018-12-18T12:38:25.701" idx="1">
+    <p:pos x="10" y="10"/>
+    <p:text/>
+    <p:extLst>
+      <p:ext uri="{C676402C-5697-4E1C-873F-D02D1690AC5C}">
+        <p15:threadingInfo xmlns:p15="http://schemas.microsoft.com/office/powerpoint/2012/main" timeZoneBias="-60"/>
+      </p:ext>
+    </p:extLst>
+  </p:cm>
+</p:cmLst>
 </file>
 
 <file path=ppt/notesMasters/notesMaster1.xml><?xml version="1.0" encoding="utf-8"?>
@@ -554,6 +580,263 @@
     <p:extLst>
       <p:ext uri="{BB962C8B-B14F-4D97-AF65-F5344CB8AC3E}">
         <p14:creationId xmlns:p14="http://schemas.microsoft.com/office/powerpoint/2010/main" val="3752406060"/>
+      </p:ext>
+    </p:extLst>
+  </p:cSld>
+  <p:clrMapOvr>
+    <a:masterClrMapping/>
+  </p:clrMapOvr>
+</p:notes>
+</file>
+
+<file path=ppt/notesSlides/notesSlide2.xml><?xml version="1.0" encoding="utf-8"?>
+<p:notes xmlns:a="http://schemas.openxmlformats.org/drawingml/2006/main" xmlns:r="http://schemas.openxmlformats.org/officeDocument/2006/relationships" xmlns:p="http://schemas.openxmlformats.org/presentationml/2006/main">
+  <p:cSld>
+    <p:spTree>
+      <p:nvGrpSpPr>
+        <p:cNvPr id="1" name=""/>
+        <p:cNvGrpSpPr/>
+        <p:nvPr/>
+      </p:nvGrpSpPr>
+      <p:grpSpPr>
+        <a:xfrm>
+          <a:off x="0" y="0"/>
+          <a:ext cx="0" cy="0"/>
+          <a:chOff x="0" y="0"/>
+          <a:chExt cx="0" cy="0"/>
+        </a:xfrm>
+      </p:grpSpPr>
+      <p:sp>
+        <p:nvSpPr>
+          <p:cNvPr id="2" name="Folienbildplatzhalter 1"/>
+          <p:cNvSpPr>
+            <a:spLocks noGrp="1" noRot="1" noChangeAspect="1"/>
+          </p:cNvSpPr>
+          <p:nvPr>
+            <p:ph type="sldImg"/>
+          </p:nvPr>
+        </p:nvSpPr>
+        <p:spPr/>
+      </p:sp>
+      <p:sp>
+        <p:nvSpPr>
+          <p:cNvPr id="3" name="Notizenplatzhalter 2"/>
+          <p:cNvSpPr>
+            <a:spLocks noGrp="1"/>
+          </p:cNvSpPr>
+          <p:nvPr>
+            <p:ph type="body" idx="1"/>
+          </p:nvPr>
+        </p:nvSpPr>
+        <p:spPr/>
+        <p:txBody>
+          <a:bodyPr/>
+          <a:lstStyle/>
+          <a:p>
+            <a:pPr marL="0" marR="0" lvl="0" indent="0" algn="l" defTabSz="914400" rtl="0" eaLnBrk="1" fontAlgn="auto" latinLnBrk="0" hangingPunct="1">
+              <a:lnSpc>
+                <a:spcPct val="100000"/>
+              </a:lnSpc>
+              <a:spcBef>
+                <a:spcPts val="0"/>
+              </a:spcBef>
+              <a:spcAft>
+                <a:spcPts val="0"/>
+              </a:spcAft>
+              <a:buClrTx/>
+              <a:buSzTx/>
+              <a:buFontTx/>
+              <a:buNone/>
+              <a:tabLst/>
+              <a:defRPr/>
+            </a:pPr>
+            <a:r>
+              <a:rPr lang="en-GB" dirty="0" smtClean="0"/>
+              <a:t>Saver: save dataset in hdf5 file</a:t>
+            </a:r>
+          </a:p>
+          <a:p>
+            <a:pPr marL="0" marR="0" lvl="0" indent="0" algn="l" defTabSz="914400" rtl="0" eaLnBrk="1" fontAlgn="auto" latinLnBrk="0" hangingPunct="1">
+              <a:lnSpc>
+                <a:spcPct val="100000"/>
+              </a:lnSpc>
+              <a:spcBef>
+                <a:spcPts val="0"/>
+              </a:spcBef>
+              <a:spcAft>
+                <a:spcPts val="0"/>
+              </a:spcAft>
+              <a:buClrTx/>
+              <a:buSzTx/>
+              <a:buFontTx/>
+              <a:buNone/>
+              <a:tabLst/>
+              <a:defRPr/>
+            </a:pPr>
+            <a:endParaRPr lang="en-GB" dirty="0" smtClean="0"/>
+          </a:p>
+          <a:p>
+            <a:endParaRPr lang="en-US" dirty="0"/>
+          </a:p>
+        </p:txBody>
+      </p:sp>
+      <p:sp>
+        <p:nvSpPr>
+          <p:cNvPr id="4" name="Foliennummernplatzhalter 3"/>
+          <p:cNvSpPr>
+            <a:spLocks noGrp="1"/>
+          </p:cNvSpPr>
+          <p:nvPr>
+            <p:ph type="sldNum" sz="quarter" idx="10"/>
+          </p:nvPr>
+        </p:nvSpPr>
+        <p:spPr/>
+        <p:txBody>
+          <a:bodyPr/>
+          <a:lstStyle/>
+          <a:p>
+            <a:fld id="{24D1A8A2-5E23-4C5A-A0E7-D0AE6A30F738}" type="slidenum">
+              <a:rPr lang="en-US" smtClean="0"/>
+              <a:t>7</a:t>
+            </a:fld>
+            <a:endParaRPr lang="en-US" dirty="0"/>
+          </a:p>
+        </p:txBody>
+      </p:sp>
+    </p:spTree>
+    <p:extLst>
+      <p:ext uri="{BB962C8B-B14F-4D97-AF65-F5344CB8AC3E}">
+        <p14:creationId xmlns:p14="http://schemas.microsoft.com/office/powerpoint/2010/main" val="142613394"/>
+      </p:ext>
+    </p:extLst>
+  </p:cSld>
+  <p:clrMapOvr>
+    <a:masterClrMapping/>
+  </p:clrMapOvr>
+</p:notes>
+</file>
+
+<file path=ppt/notesSlides/notesSlide3.xml><?xml version="1.0" encoding="utf-8"?>
+<p:notes xmlns:a="http://schemas.openxmlformats.org/drawingml/2006/main" xmlns:r="http://schemas.openxmlformats.org/officeDocument/2006/relationships" xmlns:p="http://schemas.openxmlformats.org/presentationml/2006/main">
+  <p:cSld>
+    <p:spTree>
+      <p:nvGrpSpPr>
+        <p:cNvPr id="1" name=""/>
+        <p:cNvGrpSpPr/>
+        <p:nvPr/>
+      </p:nvGrpSpPr>
+      <p:grpSpPr>
+        <a:xfrm>
+          <a:off x="0" y="0"/>
+          <a:ext cx="0" cy="0"/>
+          <a:chOff x="0" y="0"/>
+          <a:chExt cx="0" cy="0"/>
+        </a:xfrm>
+      </p:grpSpPr>
+      <p:sp>
+        <p:nvSpPr>
+          <p:cNvPr id="2" name="Folienbildplatzhalter 1"/>
+          <p:cNvSpPr>
+            <a:spLocks noGrp="1" noRot="1" noChangeAspect="1"/>
+          </p:cNvSpPr>
+          <p:nvPr>
+            <p:ph type="sldImg"/>
+          </p:nvPr>
+        </p:nvSpPr>
+        <p:spPr/>
+      </p:sp>
+      <p:sp>
+        <p:nvSpPr>
+          <p:cNvPr id="3" name="Notizenplatzhalter 2"/>
+          <p:cNvSpPr>
+            <a:spLocks noGrp="1"/>
+          </p:cNvSpPr>
+          <p:nvPr>
+            <p:ph type="body" idx="1"/>
+          </p:nvPr>
+        </p:nvSpPr>
+        <p:spPr/>
+        <p:txBody>
+          <a:bodyPr/>
+          <a:lstStyle/>
+          <a:p>
+            <a:r>
+              <a:rPr lang="en-GB" dirty="0" smtClean="0"/>
+              <a:t>Collector: </a:t>
+            </a:r>
+            <a:r>
+              <a:rPr lang="en-GB" dirty="0" err="1" smtClean="0"/>
+              <a:t>aquiring</a:t>
+            </a:r>
+            <a:r>
+              <a:rPr lang="en-GB" dirty="0" smtClean="0"/>
+              <a:t>, creating, collecting, saving matrices into a dataset</a:t>
+            </a:r>
+          </a:p>
+          <a:p>
+            <a:r>
+              <a:rPr lang="en-GB" dirty="0" smtClean="0"/>
+              <a:t>classes:</a:t>
+            </a:r>
+          </a:p>
+          <a:p>
+            <a:r>
+              <a:rPr lang="en-GB" dirty="0" smtClean="0"/>
+              <a:t>-collector: entry point</a:t>
+            </a:r>
+          </a:p>
+          <a:p>
+            <a:r>
+              <a:rPr lang="en-GB" dirty="0" smtClean="0"/>
+              <a:t>-</a:t>
+            </a:r>
+            <a:r>
+              <a:rPr lang="en-GB" dirty="0" err="1" smtClean="0"/>
+              <a:t>ssget</a:t>
+            </a:r>
+            <a:r>
+              <a:rPr lang="en-GB" dirty="0" smtClean="0"/>
+              <a:t>: fetch and cut/transform matrices from suite sparse</a:t>
+            </a:r>
+          </a:p>
+          <a:p>
+            <a:r>
+              <a:rPr lang="en-GB" dirty="0" smtClean="0"/>
+              <a:t>-generator: generating by transforming raw matrices from suite sparse and validating them</a:t>
+            </a:r>
+          </a:p>
+          <a:p>
+            <a:endParaRPr lang="en-US" dirty="0"/>
+          </a:p>
+        </p:txBody>
+      </p:sp>
+      <p:sp>
+        <p:nvSpPr>
+          <p:cNvPr id="4" name="Foliennummernplatzhalter 3"/>
+          <p:cNvSpPr>
+            <a:spLocks noGrp="1"/>
+          </p:cNvSpPr>
+          <p:nvPr>
+            <p:ph type="sldNum" sz="quarter" idx="10"/>
+          </p:nvPr>
+        </p:nvSpPr>
+        <p:spPr/>
+        <p:txBody>
+          <a:bodyPr/>
+          <a:lstStyle/>
+          <a:p>
+            <a:fld id="{24D1A8A2-5E23-4C5A-A0E7-D0AE6A30F738}" type="slidenum">
+              <a:rPr lang="en-US" smtClean="0"/>
+              <a:t>8</a:t>
+            </a:fld>
+            <a:endParaRPr lang="en-US" dirty="0"/>
+          </a:p>
+        </p:txBody>
+      </p:sp>
+    </p:spTree>
+    <p:extLst>
+      <p:ext uri="{BB962C8B-B14F-4D97-AF65-F5344CB8AC3E}">
+        <p14:creationId xmlns:p14="http://schemas.microsoft.com/office/powerpoint/2010/main" val="555338548"/>
       </p:ext>
     </p:extLst>
   </p:cSld>
@@ -1306,7 +1589,7 @@
           <a:bodyPr/>
           <a:lstStyle/>
           <a:p>
-            <a:fld id="{693E93F3-7A83-4EF4-8AF1-A21F4B241154}" type="datetimeFigureOut">
+            <a:fld id="{E4FDFFB9-18E2-4EA1-B97A-6C80F6CB2F4B}" type="datetime1">
               <a:rPr lang="en-US" smtClean="0"/>
               <a:t>12/18/2018</a:t>
             </a:fld>
@@ -1557,7 +1840,7 @@
           <a:bodyPr/>
           <a:lstStyle/>
           <a:p>
-            <a:fld id="{693E93F3-7A83-4EF4-8AF1-A21F4B241154}" type="datetimeFigureOut">
+            <a:fld id="{538C6AD1-0133-4D50-885A-DB0616740B78}" type="datetime1">
               <a:rPr lang="en-US" smtClean="0"/>
               <a:t>12/18/2018</a:t>
             </a:fld>
@@ -1871,7 +2154,7 @@
           <a:bodyPr/>
           <a:lstStyle/>
           <a:p>
-            <a:fld id="{693E93F3-7A83-4EF4-8AF1-A21F4B241154}" type="datetimeFigureOut">
+            <a:fld id="{BBB600C2-3414-4625-9C57-C78C4B0BCCFC}" type="datetime1">
               <a:rPr lang="en-US" smtClean="0"/>
               <a:t>12/18/2018</a:t>
             </a:fld>
@@ -2204,7 +2487,7 @@
           <a:bodyPr/>
           <a:lstStyle/>
           <a:p>
-            <a:fld id="{693E93F3-7A83-4EF4-8AF1-A21F4B241154}" type="datetimeFigureOut">
+            <a:fld id="{DF8382F9-714E-4D45-8DD9-F9FED6016577}" type="datetime1">
               <a:rPr lang="en-US" smtClean="0"/>
               <a:t>12/18/2018</a:t>
             </a:fld>
@@ -2518,7 +2801,7 @@
           <a:bodyPr/>
           <a:lstStyle/>
           <a:p>
-            <a:fld id="{693E93F3-7A83-4EF4-8AF1-A21F4B241154}" type="datetimeFigureOut">
+            <a:fld id="{67CAB8A5-B274-487C-96BD-ED5BEE673119}" type="datetime1">
               <a:rPr lang="en-US" smtClean="0"/>
               <a:t>12/18/2018</a:t>
             </a:fld>
@@ -2911,7 +3194,7 @@
           <a:bodyPr/>
           <a:lstStyle/>
           <a:p>
-            <a:fld id="{693E93F3-7A83-4EF4-8AF1-A21F4B241154}" type="datetimeFigureOut">
+            <a:fld id="{510A4B09-17A0-4F78-B476-F64B2F5F5926}" type="datetime1">
               <a:rPr lang="en-US" smtClean="0"/>
               <a:t>12/18/2018</a:t>
             </a:fld>
@@ -3081,7 +3364,7 @@
           <a:bodyPr/>
           <a:lstStyle/>
           <a:p>
-            <a:fld id="{693E93F3-7A83-4EF4-8AF1-A21F4B241154}" type="datetimeFigureOut">
+            <a:fld id="{76296E15-4945-4016-B646-1BD034F46E31}" type="datetime1">
               <a:rPr lang="en-US" smtClean="0"/>
               <a:t>12/18/2018</a:t>
             </a:fld>
@@ -3261,7 +3544,7 @@
           <a:bodyPr/>
           <a:lstStyle/>
           <a:p>
-            <a:fld id="{693E93F3-7A83-4EF4-8AF1-A21F4B241154}" type="datetimeFigureOut">
+            <a:fld id="{9BBBCC22-8ECB-4856-9B03-F706EFF7F527}" type="datetime1">
               <a:rPr lang="en-US" smtClean="0"/>
               <a:t>12/18/2018</a:t>
             </a:fld>
@@ -3431,7 +3714,7 @@
           <a:bodyPr/>
           <a:lstStyle/>
           <a:p>
-            <a:fld id="{693E93F3-7A83-4EF4-8AF1-A21F4B241154}" type="datetimeFigureOut">
+            <a:fld id="{813FDD1C-A247-42E7-9F17-405298C5A8E2}" type="datetime1">
               <a:rPr lang="en-US" smtClean="0"/>
               <a:t>12/18/2018</a:t>
             </a:fld>
@@ -3678,7 +3961,7 @@
           <a:bodyPr/>
           <a:lstStyle/>
           <a:p>
-            <a:fld id="{693E93F3-7A83-4EF4-8AF1-A21F4B241154}" type="datetimeFigureOut">
+            <a:fld id="{EC2D8671-B4FE-43E4-9CF9-309DDD113E8B}" type="datetime1">
               <a:rPr lang="en-US" smtClean="0"/>
               <a:t>12/18/2018</a:t>
             </a:fld>
@@ -3910,7 +4193,7 @@
           <a:bodyPr/>
           <a:lstStyle/>
           <a:p>
-            <a:fld id="{693E93F3-7A83-4EF4-8AF1-A21F4B241154}" type="datetimeFigureOut">
+            <a:fld id="{13DB681E-7641-4ED1-845F-645CF236086D}" type="datetime1">
               <a:rPr lang="en-US" smtClean="0"/>
               <a:t>12/18/2018</a:t>
             </a:fld>
@@ -4284,7 +4567,7 @@
           <a:bodyPr/>
           <a:lstStyle/>
           <a:p>
-            <a:fld id="{693E93F3-7A83-4EF4-8AF1-A21F4B241154}" type="datetimeFigureOut">
+            <a:fld id="{8336604B-3724-481C-BC6C-98343040BDF1}" type="datetime1">
               <a:rPr lang="en-US" smtClean="0"/>
               <a:t>12/18/2018</a:t>
             </a:fld>
@@ -4407,7 +4690,7 @@
           <a:bodyPr/>
           <a:lstStyle/>
           <a:p>
-            <a:fld id="{693E93F3-7A83-4EF4-8AF1-A21F4B241154}" type="datetimeFigureOut">
+            <a:fld id="{0010B748-0D26-4A27-8F88-5D3B83B2191E}" type="datetime1">
               <a:rPr lang="en-US" smtClean="0"/>
               <a:t>12/18/2018</a:t>
             </a:fld>
@@ -4502,7 +4785,7 @@
           <a:bodyPr/>
           <a:lstStyle/>
           <a:p>
-            <a:fld id="{693E93F3-7A83-4EF4-8AF1-A21F4B241154}" type="datetimeFigureOut">
+            <a:fld id="{44AF75F8-E35F-4C53-8964-A01AB0B54965}" type="datetime1">
               <a:rPr lang="en-US" smtClean="0"/>
               <a:t>12/18/2018</a:t>
             </a:fld>
@@ -4757,7 +5040,7 @@
           <a:bodyPr/>
           <a:lstStyle/>
           <a:p>
-            <a:fld id="{693E93F3-7A83-4EF4-8AF1-A21F4B241154}" type="datetimeFigureOut">
+            <a:fld id="{BA574243-0F2B-4A37-B587-985DBDC0417F}" type="datetime1">
               <a:rPr lang="en-US" smtClean="0"/>
               <a:t>12/18/2018</a:t>
             </a:fld>
@@ -5062,7 +5345,7 @@
           <a:bodyPr/>
           <a:lstStyle/>
           <a:p>
-            <a:fld id="{693E93F3-7A83-4EF4-8AF1-A21F4B241154}" type="datetimeFigureOut">
+            <a:fld id="{71535B49-8E68-4A45-ADEC-92D5DA826774}" type="datetime1">
               <a:rPr lang="en-US" smtClean="0"/>
               <a:t>12/18/2018</a:t>
             </a:fld>
@@ -5764,7 +6047,7 @@
             </a:lvl1pPr>
           </a:lstStyle>
           <a:p>
-            <a:fld id="{693E93F3-7A83-4EF4-8AF1-A21F4B241154}" type="datetimeFigureOut">
+            <a:fld id="{F7A42511-B36D-43D9-9AC1-8922DE3D7232}" type="datetime1">
               <a:rPr lang="en-US" smtClean="0"/>
               <a:t>12/18/2018</a:t>
             </a:fld>
@@ -5874,6 +6157,7 @@
     <p:sldLayoutId id="2147483726" r:id="rId15"/>
     <p:sldLayoutId id="2147483727" r:id="rId16"/>
   </p:sldLayoutIdLst>
+  <p:hf hdr="0" ftr="0" dt="0"/>
   <p:txStyles>
     <p:titleStyle>
       <a:lvl1pPr algn="l" defTabSz="457200" rtl="0" eaLnBrk="1" latinLnBrk="0" hangingPunct="1">
@@ -6378,6 +6662,29 @@
           </a:p>
         </p:txBody>
       </p:sp>
+      <p:sp>
+        <p:nvSpPr>
+          <p:cNvPr id="4" name="Foliennummernplatzhalter 3"/>
+          <p:cNvSpPr>
+            <a:spLocks noGrp="1"/>
+          </p:cNvSpPr>
+          <p:nvPr>
+            <p:ph type="sldNum" sz="quarter" idx="12"/>
+          </p:nvPr>
+        </p:nvSpPr>
+        <p:spPr/>
+        <p:txBody>
+          <a:bodyPr/>
+          <a:lstStyle/>
+          <a:p>
+            <a:fld id="{B2B8E2CE-6496-419B-95CD-C2FA6B0E2BC0}" type="slidenum">
+              <a:rPr lang="en-US" smtClean="0"/>
+              <a:t>1</a:t>
+            </a:fld>
+            <a:endParaRPr lang="en-US" dirty="0"/>
+          </a:p>
+        </p:txBody>
+      </p:sp>
     </p:spTree>
     <p:extLst>
       <p:ext uri="{BB962C8B-B14F-4D97-AF65-F5344CB8AC3E}">
@@ -6471,6 +6778,29 @@
           </a:prstGeom>
         </p:spPr>
       </p:pic>
+      <p:sp>
+        <p:nvSpPr>
+          <p:cNvPr id="3" name="Foliennummernplatzhalter 2"/>
+          <p:cNvSpPr>
+            <a:spLocks noGrp="1"/>
+          </p:cNvSpPr>
+          <p:nvPr>
+            <p:ph type="sldNum" sz="quarter" idx="12"/>
+          </p:nvPr>
+        </p:nvSpPr>
+        <p:spPr/>
+        <p:txBody>
+          <a:bodyPr/>
+          <a:lstStyle/>
+          <a:p>
+            <a:fld id="{B2B8E2CE-6496-419B-95CD-C2FA6B0E2BC0}" type="slidenum">
+              <a:rPr lang="en-US" smtClean="0"/>
+              <a:t>10</a:t>
+            </a:fld>
+            <a:endParaRPr lang="en-US" dirty="0"/>
+          </a:p>
+        </p:txBody>
+      </p:sp>
     </p:spTree>
     <p:extLst>
       <p:ext uri="{BB962C8B-B14F-4D97-AF65-F5344CB8AC3E}">
@@ -6481,6 +6811,13 @@
   <p:clrMapOvr>
     <a:masterClrMapping/>
   </p:clrMapOvr>
+  <p:timing>
+    <p:tnLst>
+      <p:par>
+        <p:cTn id="1" dur="indefinite" restart="never" nodeType="tmRoot"/>
+      </p:par>
+    </p:tnLst>
+  </p:timing>
 </p:sld>
 </file>
 
@@ -6531,6 +6868,29 @@
           </a:prstGeom>
         </p:spPr>
       </p:pic>
+      <p:sp>
+        <p:nvSpPr>
+          <p:cNvPr id="3" name="Foliennummernplatzhalter 2"/>
+          <p:cNvSpPr>
+            <a:spLocks noGrp="1"/>
+          </p:cNvSpPr>
+          <p:nvPr>
+            <p:ph type="sldNum" sz="quarter" idx="12"/>
+          </p:nvPr>
+        </p:nvSpPr>
+        <p:spPr/>
+        <p:txBody>
+          <a:bodyPr/>
+          <a:lstStyle/>
+          <a:p>
+            <a:fld id="{B2B8E2CE-6496-419B-95CD-C2FA6B0E2BC0}" type="slidenum">
+              <a:rPr lang="en-US" smtClean="0"/>
+              <a:t>11</a:t>
+            </a:fld>
+            <a:endParaRPr lang="en-US" dirty="0"/>
+          </a:p>
+        </p:txBody>
+      </p:sp>
     </p:spTree>
     <p:extLst>
       <p:ext uri="{BB962C8B-B14F-4D97-AF65-F5344CB8AC3E}">
@@ -6614,6 +6974,29 @@
           </a:prstGeom>
         </p:spPr>
       </p:pic>
+      <p:sp>
+        <p:nvSpPr>
+          <p:cNvPr id="4" name="Foliennummernplatzhalter 3"/>
+          <p:cNvSpPr>
+            <a:spLocks noGrp="1"/>
+          </p:cNvSpPr>
+          <p:nvPr>
+            <p:ph type="sldNum" sz="quarter" idx="12"/>
+          </p:nvPr>
+        </p:nvSpPr>
+        <p:spPr/>
+        <p:txBody>
+          <a:bodyPr/>
+          <a:lstStyle/>
+          <a:p>
+            <a:fld id="{B2B8E2CE-6496-419B-95CD-C2FA6B0E2BC0}" type="slidenum">
+              <a:rPr lang="en-US" smtClean="0"/>
+              <a:t>12</a:t>
+            </a:fld>
+            <a:endParaRPr lang="en-US" dirty="0"/>
+          </a:p>
+        </p:txBody>
+      </p:sp>
     </p:spTree>
     <p:extLst>
       <p:ext uri="{BB962C8B-B14F-4D97-AF65-F5344CB8AC3E}">
@@ -6706,6 +7089,29 @@
           </a:prstGeom>
         </p:spPr>
       </p:pic>
+      <p:sp>
+        <p:nvSpPr>
+          <p:cNvPr id="3" name="Foliennummernplatzhalter 2"/>
+          <p:cNvSpPr>
+            <a:spLocks noGrp="1"/>
+          </p:cNvSpPr>
+          <p:nvPr>
+            <p:ph type="sldNum" sz="quarter" idx="12"/>
+          </p:nvPr>
+        </p:nvSpPr>
+        <p:spPr/>
+        <p:txBody>
+          <a:bodyPr/>
+          <a:lstStyle/>
+          <a:p>
+            <a:fld id="{B2B8E2CE-6496-419B-95CD-C2FA6B0E2BC0}" type="slidenum">
+              <a:rPr lang="en-US" smtClean="0"/>
+              <a:t>13</a:t>
+            </a:fld>
+            <a:endParaRPr lang="en-US" dirty="0"/>
+          </a:p>
+        </p:txBody>
+      </p:sp>
     </p:spTree>
     <p:extLst>
       <p:ext uri="{BB962C8B-B14F-4D97-AF65-F5344CB8AC3E}">
@@ -6716,6 +7122,13 @@
   <p:clrMapOvr>
     <a:masterClrMapping/>
   </p:clrMapOvr>
+  <p:timing>
+    <p:tnLst>
+      <p:par>
+        <p:cTn id="1" dur="indefinite" restart="never" nodeType="tmRoot"/>
+      </p:par>
+    </p:tnLst>
+  </p:timing>
 </p:sld>
 </file>
 
@@ -6766,6 +7179,29 @@
           </a:prstGeom>
         </p:spPr>
       </p:pic>
+      <p:sp>
+        <p:nvSpPr>
+          <p:cNvPr id="3" name="Foliennummernplatzhalter 2"/>
+          <p:cNvSpPr>
+            <a:spLocks noGrp="1"/>
+          </p:cNvSpPr>
+          <p:nvPr>
+            <p:ph type="sldNum" sz="quarter" idx="12"/>
+          </p:nvPr>
+        </p:nvSpPr>
+        <p:spPr/>
+        <p:txBody>
+          <a:bodyPr/>
+          <a:lstStyle/>
+          <a:p>
+            <a:fld id="{B2B8E2CE-6496-419B-95CD-C2FA6B0E2BC0}" type="slidenum">
+              <a:rPr lang="en-US" smtClean="0"/>
+              <a:t>14</a:t>
+            </a:fld>
+            <a:endParaRPr lang="en-US" dirty="0"/>
+          </a:p>
+        </p:txBody>
+      </p:sp>
     </p:spTree>
     <p:extLst>
       <p:ext uri="{BB962C8B-B14F-4D97-AF65-F5344CB8AC3E}">
@@ -6776,6 +7212,13 @@
   <p:clrMapOvr>
     <a:masterClrMapping/>
   </p:clrMapOvr>
+  <p:timing>
+    <p:tnLst>
+      <p:par>
+        <p:cTn id="1" dur="indefinite" restart="never" nodeType="tmRoot"/>
+      </p:par>
+    </p:tnLst>
+  </p:timing>
 </p:sld>
 </file>
 
@@ -6826,6 +7269,29 @@
           </a:prstGeom>
         </p:spPr>
       </p:pic>
+      <p:sp>
+        <p:nvSpPr>
+          <p:cNvPr id="3" name="Foliennummernplatzhalter 2"/>
+          <p:cNvSpPr>
+            <a:spLocks noGrp="1"/>
+          </p:cNvSpPr>
+          <p:nvPr>
+            <p:ph type="sldNum" sz="quarter" idx="12"/>
+          </p:nvPr>
+        </p:nvSpPr>
+        <p:spPr/>
+        <p:txBody>
+          <a:bodyPr/>
+          <a:lstStyle/>
+          <a:p>
+            <a:fld id="{B2B8E2CE-6496-419B-95CD-C2FA6B0E2BC0}" type="slidenum">
+              <a:rPr lang="en-US" smtClean="0"/>
+              <a:t>15</a:t>
+            </a:fld>
+            <a:endParaRPr lang="en-US" dirty="0"/>
+          </a:p>
+        </p:txBody>
+      </p:sp>
     </p:spTree>
     <p:extLst>
       <p:ext uri="{BB962C8B-B14F-4D97-AF65-F5344CB8AC3E}">
@@ -6924,6 +7390,29 @@
           </a:prstGeom>
         </p:spPr>
       </p:pic>
+      <p:sp>
+        <p:nvSpPr>
+          <p:cNvPr id="3" name="Foliennummernplatzhalter 2"/>
+          <p:cNvSpPr>
+            <a:spLocks noGrp="1"/>
+          </p:cNvSpPr>
+          <p:nvPr>
+            <p:ph type="sldNum" sz="quarter" idx="12"/>
+          </p:nvPr>
+        </p:nvSpPr>
+        <p:spPr/>
+        <p:txBody>
+          <a:bodyPr/>
+          <a:lstStyle/>
+          <a:p>
+            <a:fld id="{B2B8E2CE-6496-419B-95CD-C2FA6B0E2BC0}" type="slidenum">
+              <a:rPr lang="en-US" smtClean="0"/>
+              <a:t>2</a:t>
+            </a:fld>
+            <a:endParaRPr lang="en-US" dirty="0"/>
+          </a:p>
+        </p:txBody>
+      </p:sp>
     </p:spTree>
     <p:extLst>
       <p:ext uri="{BB962C8B-B14F-4D97-AF65-F5344CB8AC3E}">
@@ -6934,10 +7423,231 @@
   <p:clrMapOvr>
     <a:masterClrMapping/>
   </p:clrMapOvr>
+  <p:timing>
+    <p:tnLst>
+      <p:par>
+        <p:cTn id="1" dur="indefinite" restart="never" nodeType="tmRoot"/>
+      </p:par>
+    </p:tnLst>
+  </p:timing>
 </p:sld>
 </file>
 
 <file path=ppt/slides/slide3.xml><?xml version="1.0" encoding="utf-8"?>
+<p:sld xmlns:a="http://schemas.openxmlformats.org/drawingml/2006/main" xmlns:r="http://schemas.openxmlformats.org/officeDocument/2006/relationships" xmlns:p="http://schemas.openxmlformats.org/presentationml/2006/main">
+  <p:cSld>
+    <p:spTree>
+      <p:nvGrpSpPr>
+        <p:cNvPr id="1" name=""/>
+        <p:cNvGrpSpPr/>
+        <p:nvPr/>
+      </p:nvGrpSpPr>
+      <p:grpSpPr>
+        <a:xfrm>
+          <a:off x="0" y="0"/>
+          <a:ext cx="0" cy="0"/>
+          <a:chOff x="0" y="0"/>
+          <a:chExt cx="0" cy="0"/>
+        </a:xfrm>
+      </p:grpSpPr>
+      <p:sp>
+        <p:nvSpPr>
+          <p:cNvPr id="2" name="Titel 1"/>
+          <p:cNvSpPr>
+            <a:spLocks noGrp="1"/>
+          </p:cNvSpPr>
+          <p:nvPr>
+            <p:ph type="title"/>
+          </p:nvPr>
+        </p:nvSpPr>
+        <p:spPr>
+          <a:xfrm>
+            <a:off x="2946166" y="431007"/>
+            <a:ext cx="4158985" cy="640556"/>
+          </a:xfrm>
+        </p:spPr>
+        <p:txBody>
+          <a:bodyPr/>
+          <a:lstStyle/>
+          <a:p>
+            <a:pPr algn="ctr"/>
+            <a:r>
+              <a:rPr lang="de-DE" dirty="0"/>
+              <a:t>Controller Module</a:t>
+            </a:r>
+            <a:endParaRPr lang="en-US" dirty="0"/>
+          </a:p>
+        </p:txBody>
+      </p:sp>
+      <p:pic>
+        <p:nvPicPr>
+          <p:cNvPr id="5" name="Grafik 4">
+            <a:extLst>
+              <a:ext uri="{FF2B5EF4-FFF2-40B4-BE49-F238E27FC236}">
+                <a16:creationId xmlns:a16="http://schemas.microsoft.com/office/drawing/2014/main" id="{579E7B1B-9464-477C-8BE1-D861DFB29DCA}"/>
+              </a:ext>
+            </a:extLst>
+          </p:cNvPr>
+          <p:cNvPicPr>
+            <a:picLocks noChangeAspect="1"/>
+          </p:cNvPicPr>
+          <p:nvPr/>
+        </p:nvPicPr>
+        <p:blipFill>
+          <a:blip r:embed="rId2">
+            <a:extLst>
+              <a:ext uri="{28A0092B-C50C-407E-A947-70E740481C1C}">
+                <a14:useLocalDpi xmlns:a14="http://schemas.microsoft.com/office/drawing/2010/main" val="0"/>
+              </a:ext>
+            </a:extLst>
+          </a:blip>
+          <a:stretch>
+            <a:fillRect/>
+          </a:stretch>
+        </p:blipFill>
+        <p:spPr>
+          <a:xfrm>
+            <a:off x="328669" y="1122759"/>
+            <a:ext cx="9042891" cy="4612481"/>
+          </a:xfrm>
+          <a:prstGeom prst="rect">
+            <a:avLst/>
+          </a:prstGeom>
+        </p:spPr>
+      </p:pic>
+      <p:sp>
+        <p:nvSpPr>
+          <p:cNvPr id="3" name="Foliennummernplatzhalter 2"/>
+          <p:cNvSpPr>
+            <a:spLocks noGrp="1"/>
+          </p:cNvSpPr>
+          <p:nvPr>
+            <p:ph type="sldNum" sz="quarter" idx="12"/>
+          </p:nvPr>
+        </p:nvSpPr>
+        <p:spPr/>
+        <p:txBody>
+          <a:bodyPr/>
+          <a:lstStyle/>
+          <a:p>
+            <a:fld id="{B2B8E2CE-6496-419B-95CD-C2FA6B0E2BC0}" type="slidenum">
+              <a:rPr lang="en-US" smtClean="0"/>
+              <a:t>3</a:t>
+            </a:fld>
+            <a:endParaRPr lang="en-US" dirty="0"/>
+          </a:p>
+        </p:txBody>
+      </p:sp>
+    </p:spTree>
+    <p:extLst>
+      <p:ext uri="{BB962C8B-B14F-4D97-AF65-F5344CB8AC3E}">
+        <p14:creationId xmlns:p14="http://schemas.microsoft.com/office/powerpoint/2010/main" val="1908483822"/>
+      </p:ext>
+    </p:extLst>
+  </p:cSld>
+  <p:clrMapOvr>
+    <a:masterClrMapping/>
+  </p:clrMapOvr>
+  <p:timing>
+    <p:tnLst>
+      <p:par>
+        <p:cTn id="1" dur="indefinite" restart="never" nodeType="tmRoot"/>
+      </p:par>
+    </p:tnLst>
+  </p:timing>
+</p:sld>
+</file>
+
+<file path=ppt/slides/slide4.xml><?xml version="1.0" encoding="utf-8"?>
+<p:sld xmlns:a="http://schemas.openxmlformats.org/drawingml/2006/main" xmlns:r="http://schemas.openxmlformats.org/officeDocument/2006/relationships" xmlns:p="http://schemas.openxmlformats.org/presentationml/2006/main">
+  <p:cSld>
+    <p:spTree>
+      <p:nvGrpSpPr>
+        <p:cNvPr id="1" name=""/>
+        <p:cNvGrpSpPr/>
+        <p:nvPr/>
+      </p:nvGrpSpPr>
+      <p:grpSpPr>
+        <a:xfrm>
+          <a:off x="0" y="0"/>
+          <a:ext cx="0" cy="0"/>
+          <a:chOff x="0" y="0"/>
+          <a:chExt cx="0" cy="0"/>
+        </a:xfrm>
+      </p:grpSpPr>
+      <p:pic>
+        <p:nvPicPr>
+          <p:cNvPr id="4" name="Grafik 3">
+            <a:extLst>
+              <a:ext uri="{FF2B5EF4-FFF2-40B4-BE49-F238E27FC236}">
+                <a16:creationId xmlns:a16="http://schemas.microsoft.com/office/drawing/2014/main" id="{C7B59DA5-BC0A-4F06-BD6D-A8DEE3878760}"/>
+              </a:ext>
+            </a:extLst>
+          </p:cNvPr>
+          <p:cNvPicPr>
+            <a:picLocks noChangeAspect="1"/>
+          </p:cNvPicPr>
+          <p:nvPr/>
+        </p:nvPicPr>
+        <p:blipFill>
+          <a:blip r:embed="rId2">
+            <a:extLst>
+              <a:ext uri="{28A0092B-C50C-407E-A947-70E740481C1C}">
+                <a14:useLocalDpi xmlns:a14="http://schemas.microsoft.com/office/drawing/2010/main" val="0"/>
+              </a:ext>
+            </a:extLst>
+          </a:blip>
+          <a:stretch>
+            <a:fillRect/>
+          </a:stretch>
+        </p:blipFill>
+        <p:spPr>
+          <a:xfrm>
+            <a:off x="344576" y="159656"/>
+            <a:ext cx="8971727" cy="6284687"/>
+          </a:xfrm>
+          <a:prstGeom prst="rect">
+            <a:avLst/>
+          </a:prstGeom>
+        </p:spPr>
+      </p:pic>
+      <p:sp>
+        <p:nvSpPr>
+          <p:cNvPr id="2" name="Foliennummernplatzhalter 1"/>
+          <p:cNvSpPr>
+            <a:spLocks noGrp="1"/>
+          </p:cNvSpPr>
+          <p:nvPr>
+            <p:ph type="sldNum" sz="quarter" idx="12"/>
+          </p:nvPr>
+        </p:nvSpPr>
+        <p:spPr/>
+        <p:txBody>
+          <a:bodyPr/>
+          <a:lstStyle/>
+          <a:p>
+            <a:fld id="{B2B8E2CE-6496-419B-95CD-C2FA6B0E2BC0}" type="slidenum">
+              <a:rPr lang="en-US" smtClean="0"/>
+              <a:t>4</a:t>
+            </a:fld>
+            <a:endParaRPr lang="en-US" dirty="0"/>
+          </a:p>
+        </p:txBody>
+      </p:sp>
+    </p:spTree>
+    <p:extLst>
+      <p:ext uri="{BB962C8B-B14F-4D97-AF65-F5344CB8AC3E}">
+        <p14:creationId xmlns:p14="http://schemas.microsoft.com/office/powerpoint/2010/main" val="2748402338"/>
+      </p:ext>
+    </p:extLst>
+  </p:cSld>
+  <p:clrMapOvr>
+    <a:masterClrMapping/>
+  </p:clrMapOvr>
+</p:sld>
+</file>
+
+<file path=ppt/slides/slide5.xml><?xml version="1.0" encoding="utf-8"?>
 <p:sld xmlns:a="http://schemas.openxmlformats.org/drawingml/2006/main" xmlns:r="http://schemas.openxmlformats.org/officeDocument/2006/relationships" xmlns:p="http://schemas.openxmlformats.org/presentationml/2006/main">
   <p:cSld>
     <p:spTree>
@@ -7019,6 +7729,29 @@
           </a:prstGeom>
         </p:spPr>
       </p:pic>
+      <p:sp>
+        <p:nvSpPr>
+          <p:cNvPr id="3" name="Foliennummernplatzhalter 2"/>
+          <p:cNvSpPr>
+            <a:spLocks noGrp="1"/>
+          </p:cNvSpPr>
+          <p:nvPr>
+            <p:ph type="sldNum" sz="quarter" idx="12"/>
+          </p:nvPr>
+        </p:nvSpPr>
+        <p:spPr/>
+        <p:txBody>
+          <a:bodyPr/>
+          <a:lstStyle/>
+          <a:p>
+            <a:fld id="{B2B8E2CE-6496-419B-95CD-C2FA6B0E2BC0}" type="slidenum">
+              <a:rPr lang="en-US" smtClean="0"/>
+              <a:t>5</a:t>
+            </a:fld>
+            <a:endParaRPr lang="en-US" dirty="0"/>
+          </a:p>
+        </p:txBody>
+      </p:sp>
     </p:spTree>
     <p:extLst>
       <p:ext uri="{BB962C8B-B14F-4D97-AF65-F5344CB8AC3E}">
@@ -7029,10 +7762,17 @@
   <p:clrMapOvr>
     <a:masterClrMapping/>
   </p:clrMapOvr>
+  <p:timing>
+    <p:tnLst>
+      <p:par>
+        <p:cTn id="1" dur="indefinite" restart="never" nodeType="tmRoot"/>
+      </p:par>
+    </p:tnLst>
+  </p:timing>
 </p:sld>
 </file>
 
-<file path=ppt/slides/slide4.xml><?xml version="1.0" encoding="utf-8"?>
+<file path=ppt/slides/slide6.xml><?xml version="1.0" encoding="utf-8"?>
 <p:sld xmlns:a="http://schemas.openxmlformats.org/drawingml/2006/main" xmlns:r="http://schemas.openxmlformats.org/officeDocument/2006/relationships" xmlns:p="http://schemas.openxmlformats.org/presentationml/2006/main">
   <p:cSld>
     <p:spTree>
@@ -7085,6 +7825,29 @@
           </a:prstGeom>
         </p:spPr>
       </p:pic>
+      <p:sp>
+        <p:nvSpPr>
+          <p:cNvPr id="2" name="Foliennummernplatzhalter 1"/>
+          <p:cNvSpPr>
+            <a:spLocks noGrp="1"/>
+          </p:cNvSpPr>
+          <p:nvPr>
+            <p:ph type="sldNum" sz="quarter" idx="12"/>
+          </p:nvPr>
+        </p:nvSpPr>
+        <p:spPr/>
+        <p:txBody>
+          <a:bodyPr/>
+          <a:lstStyle/>
+          <a:p>
+            <a:fld id="{B2B8E2CE-6496-419B-95CD-C2FA6B0E2BC0}" type="slidenum">
+              <a:rPr lang="en-US" smtClean="0"/>
+              <a:t>6</a:t>
+            </a:fld>
+            <a:endParaRPr lang="en-US" dirty="0"/>
+          </a:p>
+        </p:txBody>
+      </p:sp>
     </p:spTree>
     <p:extLst>
       <p:ext uri="{BB962C8B-B14F-4D97-AF65-F5344CB8AC3E}">
@@ -7095,167 +7858,13 @@
   <p:clrMapOvr>
     <a:masterClrMapping/>
   </p:clrMapOvr>
-</p:sld>
-</file>
-
-<file path=ppt/slides/slide5.xml><?xml version="1.0" encoding="utf-8"?>
-<p:sld xmlns:a="http://schemas.openxmlformats.org/drawingml/2006/main" xmlns:r="http://schemas.openxmlformats.org/officeDocument/2006/relationships" xmlns:p="http://schemas.openxmlformats.org/presentationml/2006/main">
-  <p:cSld>
-    <p:spTree>
-      <p:nvGrpSpPr>
-        <p:cNvPr id="1" name=""/>
-        <p:cNvGrpSpPr/>
-        <p:nvPr/>
-      </p:nvGrpSpPr>
-      <p:grpSpPr>
-        <a:xfrm>
-          <a:off x="0" y="0"/>
-          <a:ext cx="0" cy="0"/>
-          <a:chOff x="0" y="0"/>
-          <a:chExt cx="0" cy="0"/>
-        </a:xfrm>
-      </p:grpSpPr>
-      <p:sp>
-        <p:nvSpPr>
-          <p:cNvPr id="2" name="Titel 1"/>
-          <p:cNvSpPr>
-            <a:spLocks noGrp="1"/>
-          </p:cNvSpPr>
-          <p:nvPr>
-            <p:ph type="title"/>
-          </p:nvPr>
-        </p:nvSpPr>
-        <p:spPr>
-          <a:xfrm>
-            <a:off x="2946166" y="431007"/>
-            <a:ext cx="4158985" cy="640556"/>
-          </a:xfrm>
-        </p:spPr>
-        <p:txBody>
-          <a:bodyPr/>
-          <a:lstStyle/>
-          <a:p>
-            <a:pPr algn="ctr"/>
-            <a:r>
-              <a:rPr lang="de-DE" dirty="0"/>
-              <a:t>Controller Module</a:t>
-            </a:r>
-            <a:endParaRPr lang="en-US" dirty="0"/>
-          </a:p>
-        </p:txBody>
-      </p:sp>
-      <p:pic>
-        <p:nvPicPr>
-          <p:cNvPr id="5" name="Grafik 4">
-            <a:extLst>
-              <a:ext uri="{FF2B5EF4-FFF2-40B4-BE49-F238E27FC236}">
-                <a16:creationId xmlns:a16="http://schemas.microsoft.com/office/drawing/2014/main" id="{579E7B1B-9464-477C-8BE1-D861DFB29DCA}"/>
-              </a:ext>
-            </a:extLst>
-          </p:cNvPr>
-          <p:cNvPicPr>
-            <a:picLocks noChangeAspect="1"/>
-          </p:cNvPicPr>
-          <p:nvPr/>
-        </p:nvPicPr>
-        <p:blipFill>
-          <a:blip r:embed="rId2">
-            <a:extLst>
-              <a:ext uri="{28A0092B-C50C-407E-A947-70E740481C1C}">
-                <a14:useLocalDpi xmlns:a14="http://schemas.microsoft.com/office/drawing/2010/main" val="0"/>
-              </a:ext>
-            </a:extLst>
-          </a:blip>
-          <a:stretch>
-            <a:fillRect/>
-          </a:stretch>
-        </p:blipFill>
-        <p:spPr>
-          <a:xfrm>
-            <a:off x="328669" y="1122759"/>
-            <a:ext cx="9042891" cy="4612481"/>
-          </a:xfrm>
-          <a:prstGeom prst="rect">
-            <a:avLst/>
-          </a:prstGeom>
-        </p:spPr>
-      </p:pic>
-    </p:spTree>
-    <p:extLst>
-      <p:ext uri="{BB962C8B-B14F-4D97-AF65-F5344CB8AC3E}">
-        <p14:creationId xmlns:p14="http://schemas.microsoft.com/office/powerpoint/2010/main" val="1908483822"/>
-      </p:ext>
-    </p:extLst>
-  </p:cSld>
-  <p:clrMapOvr>
-    <a:masterClrMapping/>
-  </p:clrMapOvr>
-</p:sld>
-</file>
-
-<file path=ppt/slides/slide6.xml><?xml version="1.0" encoding="utf-8"?>
-<p:sld xmlns:a="http://schemas.openxmlformats.org/drawingml/2006/main" xmlns:r="http://schemas.openxmlformats.org/officeDocument/2006/relationships" xmlns:p="http://schemas.openxmlformats.org/presentationml/2006/main">
-  <p:cSld>
-    <p:spTree>
-      <p:nvGrpSpPr>
-        <p:cNvPr id="1" name=""/>
-        <p:cNvGrpSpPr/>
-        <p:nvPr/>
-      </p:nvGrpSpPr>
-      <p:grpSpPr>
-        <a:xfrm>
-          <a:off x="0" y="0"/>
-          <a:ext cx="0" cy="0"/>
-          <a:chOff x="0" y="0"/>
-          <a:chExt cx="0" cy="0"/>
-        </a:xfrm>
-      </p:grpSpPr>
-      <p:pic>
-        <p:nvPicPr>
-          <p:cNvPr id="4" name="Grafik 3">
-            <a:extLst>
-              <a:ext uri="{FF2B5EF4-FFF2-40B4-BE49-F238E27FC236}">
-                <a16:creationId xmlns:a16="http://schemas.microsoft.com/office/drawing/2014/main" id="{C7B59DA5-BC0A-4F06-BD6D-A8DEE3878760}"/>
-              </a:ext>
-            </a:extLst>
-          </p:cNvPr>
-          <p:cNvPicPr>
-            <a:picLocks noChangeAspect="1"/>
-          </p:cNvPicPr>
-          <p:nvPr/>
-        </p:nvPicPr>
-        <p:blipFill>
-          <a:blip r:embed="rId2">
-            <a:extLst>
-              <a:ext uri="{28A0092B-C50C-407E-A947-70E740481C1C}">
-                <a14:useLocalDpi xmlns:a14="http://schemas.microsoft.com/office/drawing/2010/main" val="0"/>
-              </a:ext>
-            </a:extLst>
-          </a:blip>
-          <a:stretch>
-            <a:fillRect/>
-          </a:stretch>
-        </p:blipFill>
-        <p:spPr>
-          <a:xfrm>
-            <a:off x="344576" y="159656"/>
-            <a:ext cx="8971727" cy="6284687"/>
-          </a:xfrm>
-          <a:prstGeom prst="rect">
-            <a:avLst/>
-          </a:prstGeom>
-        </p:spPr>
-      </p:pic>
-    </p:spTree>
-    <p:extLst>
-      <p:ext uri="{BB962C8B-B14F-4D97-AF65-F5344CB8AC3E}">
-        <p14:creationId xmlns:p14="http://schemas.microsoft.com/office/powerpoint/2010/main" val="2748402338"/>
-      </p:ext>
-    </p:extLst>
-  </p:cSld>
-  <p:clrMapOvr>
-    <a:masterClrMapping/>
-  </p:clrMapOvr>
+  <p:timing>
+    <p:tnLst>
+      <p:par>
+        <p:cTn id="1" dur="indefinite" restart="never" nodeType="tmRoot"/>
+      </p:par>
+    </p:tnLst>
+  </p:timing>
 </p:sld>
 </file>
 
@@ -7317,7 +7926,7 @@
           <p:nvPr/>
         </p:nvPicPr>
         <p:blipFill>
-          <a:blip r:embed="rId2"/>
+          <a:blip r:embed="rId3"/>
           <a:stretch>
             <a:fillRect/>
           </a:stretch>
@@ -7332,6 +7941,29 @@
           </a:prstGeom>
         </p:spPr>
       </p:pic>
+      <p:sp>
+        <p:nvSpPr>
+          <p:cNvPr id="4" name="Foliennummernplatzhalter 3"/>
+          <p:cNvSpPr>
+            <a:spLocks noGrp="1"/>
+          </p:cNvSpPr>
+          <p:nvPr>
+            <p:ph type="sldNum" sz="quarter" idx="12"/>
+          </p:nvPr>
+        </p:nvSpPr>
+        <p:spPr/>
+        <p:txBody>
+          <a:bodyPr/>
+          <a:lstStyle/>
+          <a:p>
+            <a:fld id="{B2B8E2CE-6496-419B-95CD-C2FA6B0E2BC0}" type="slidenum">
+              <a:rPr lang="en-US" smtClean="0"/>
+              <a:t>7</a:t>
+            </a:fld>
+            <a:endParaRPr lang="en-US" dirty="0"/>
+          </a:p>
+        </p:txBody>
+      </p:sp>
     </p:spTree>
     <p:extLst>
       <p:ext uri="{BB962C8B-B14F-4D97-AF65-F5344CB8AC3E}">
@@ -7342,6 +7974,13 @@
   <p:clrMapOvr>
     <a:masterClrMapping/>
   </p:clrMapOvr>
+  <p:timing>
+    <p:tnLst>
+      <p:par>
+        <p:cTn id="1" dur="indefinite" restart="never" nodeType="tmRoot"/>
+      </p:par>
+    </p:tnLst>
+  </p:timing>
 </p:sld>
 </file>
 
@@ -7404,7 +8043,7 @@
           <p:nvPr/>
         </p:nvPicPr>
         <p:blipFill>
-          <a:blip r:embed="rId2">
+          <a:blip r:embed="rId3">
             <a:extLst>
               <a:ext uri="{28A0092B-C50C-407E-A947-70E740481C1C}">
                 <a14:useLocalDpi xmlns:a14="http://schemas.microsoft.com/office/drawing/2010/main" val="0"/>
@@ -7425,6 +8064,29 @@
           </a:prstGeom>
         </p:spPr>
       </p:pic>
+      <p:sp>
+        <p:nvSpPr>
+          <p:cNvPr id="3" name="Foliennummernplatzhalter 2"/>
+          <p:cNvSpPr>
+            <a:spLocks noGrp="1"/>
+          </p:cNvSpPr>
+          <p:nvPr>
+            <p:ph type="sldNum" sz="quarter" idx="12"/>
+          </p:nvPr>
+        </p:nvSpPr>
+        <p:spPr/>
+        <p:txBody>
+          <a:bodyPr/>
+          <a:lstStyle/>
+          <a:p>
+            <a:fld id="{B2B8E2CE-6496-419B-95CD-C2FA6B0E2BC0}" type="slidenum">
+              <a:rPr lang="en-US" smtClean="0"/>
+              <a:t>8</a:t>
+            </a:fld>
+            <a:endParaRPr lang="en-US" dirty="0"/>
+          </a:p>
+        </p:txBody>
+      </p:sp>
     </p:spTree>
     <p:extLst>
       <p:ext uri="{BB962C8B-B14F-4D97-AF65-F5344CB8AC3E}">
@@ -7435,6 +8097,13 @@
   <p:clrMapOvr>
     <a:masterClrMapping/>
   </p:clrMapOvr>
+  <p:timing>
+    <p:tnLst>
+      <p:par>
+        <p:cTn id="1" dur="indefinite" restart="never" nodeType="tmRoot"/>
+      </p:par>
+    </p:tnLst>
+  </p:timing>
 </p:sld>
 </file>
 
@@ -7485,6 +8154,29 @@
           </a:prstGeom>
         </p:spPr>
       </p:pic>
+      <p:sp>
+        <p:nvSpPr>
+          <p:cNvPr id="3" name="Foliennummernplatzhalter 2"/>
+          <p:cNvSpPr>
+            <a:spLocks noGrp="1"/>
+          </p:cNvSpPr>
+          <p:nvPr>
+            <p:ph type="sldNum" sz="quarter" idx="12"/>
+          </p:nvPr>
+        </p:nvSpPr>
+        <p:spPr/>
+        <p:txBody>
+          <a:bodyPr/>
+          <a:lstStyle/>
+          <a:p>
+            <a:fld id="{B2B8E2CE-6496-419B-95CD-C2FA6B0E2BC0}" type="slidenum">
+              <a:rPr lang="en-US" smtClean="0"/>
+              <a:t>9</a:t>
+            </a:fld>
+            <a:endParaRPr lang="en-US" dirty="0"/>
+          </a:p>
+        </p:txBody>
+      </p:sp>
     </p:spTree>
     <p:extLst>
       <p:ext uri="{BB962C8B-B14F-4D97-AF65-F5344CB8AC3E}">
@@ -7495,6 +8187,13 @@
   <p:clrMapOvr>
     <a:masterClrMapping/>
   </p:clrMapOvr>
+  <p:timing>
+    <p:tnLst>
+      <p:par>
+        <p:cTn id="1" dur="indefinite" restart="never" nodeType="tmRoot"/>
+      </p:par>
+    </p:tnLst>
+  </p:timing>
 </p:sld>
 </file>
 

</xml_diff>

<commit_message>
edited pres and latex doc
</commit_message>
<xml_diff>
--- a/DesignDocument/Def_sheet_presentation.pptx
+++ b/DesignDocument/Def_sheet_presentation.pptx
@@ -652,7 +652,47 @@
             </a:pPr>
             <a:r>
               <a:rPr lang="en-GB" dirty="0" smtClean="0"/>
-              <a:t>Saver: save dataset in hdf5 file</a:t>
+              <a:t>used </a:t>
+            </a:r>
+            <a:r>
+              <a:rPr lang="en-GB" smtClean="0"/>
+              <a:t>by multiple</a:t>
+            </a:r>
+            <a:r>
+              <a:rPr lang="en-GB" baseline="0" smtClean="0"/>
+              <a:t> </a:t>
+            </a:r>
+            <a:r>
+              <a:rPr lang="en-GB" smtClean="0"/>
+              <a:t>modules</a:t>
+            </a:r>
+            <a:endParaRPr lang="en-GB" dirty="0" smtClean="0"/>
+          </a:p>
+          <a:p>
+            <a:pPr marL="0" marR="0" lvl="0" indent="0" algn="l" defTabSz="914400" rtl="0" eaLnBrk="1" fontAlgn="auto" latinLnBrk="0" hangingPunct="1">
+              <a:lnSpc>
+                <a:spcPct val="100000"/>
+              </a:lnSpc>
+              <a:spcBef>
+                <a:spcPts val="0"/>
+              </a:spcBef>
+              <a:spcAft>
+                <a:spcPts val="0"/>
+              </a:spcAft>
+              <a:buClrTx/>
+              <a:buSzTx/>
+              <a:buFontTx/>
+              <a:buNone/>
+              <a:tabLst/>
+              <a:defRPr/>
+            </a:pPr>
+            <a:r>
+              <a:rPr lang="en-GB" dirty="0" smtClean="0"/>
+              <a:t>Saver</a:t>
+            </a:r>
+            <a:r>
+              <a:rPr lang="en-GB" dirty="0" smtClean="0"/>
+              <a:t>: save dataset in hdf5 file</a:t>
             </a:r>
           </a:p>
           <a:p>

</xml_diff>